<commit_message>
updated doucmentation for first design pattern of part 2.
</commit_message>
<xml_diff>
--- a/documentation/assignment_3_documentation.pptx
+++ b/documentation/assignment_3_documentation.pptx
@@ -8,7 +8,10 @@
     <p:sldId id="256" r:id="rId2"/>
     <p:sldId id="257" r:id="rId3"/>
     <p:sldId id="258" r:id="rId4"/>
-    <p:sldId id="259" r:id="rId5"/>
+    <p:sldId id="261" r:id="rId5"/>
+    <p:sldId id="262" r:id="rId6"/>
+    <p:sldId id="259" r:id="rId7"/>
+    <p:sldId id="260" r:id="rId8"/>
   </p:sldIdLst>
   <p:sldSz cx="12192000" cy="6858000"/>
   <p:notesSz cx="6858000" cy="9144000"/>
@@ -246,7 +249,7 @@
           <a:p>
             <a:fld id="{29BFBE3C-366C-47CB-AC1E-21A69A5DBB68}" type="datetimeFigureOut">
               <a:rPr lang="en-NZ" smtClean="0"/>
-              <a:t>24/10/2017</a:t>
+              <a:t>31/10/2017</a:t>
             </a:fld>
             <a:endParaRPr lang="en-NZ"/>
           </a:p>
@@ -416,7 +419,7 @@
           <a:p>
             <a:fld id="{29BFBE3C-366C-47CB-AC1E-21A69A5DBB68}" type="datetimeFigureOut">
               <a:rPr lang="en-NZ" smtClean="0"/>
-              <a:t>24/10/2017</a:t>
+              <a:t>31/10/2017</a:t>
             </a:fld>
             <a:endParaRPr lang="en-NZ"/>
           </a:p>
@@ -596,7 +599,7 @@
           <a:p>
             <a:fld id="{29BFBE3C-366C-47CB-AC1E-21A69A5DBB68}" type="datetimeFigureOut">
               <a:rPr lang="en-NZ" smtClean="0"/>
-              <a:t>24/10/2017</a:t>
+              <a:t>31/10/2017</a:t>
             </a:fld>
             <a:endParaRPr lang="en-NZ"/>
           </a:p>
@@ -766,7 +769,7 @@
           <a:p>
             <a:fld id="{29BFBE3C-366C-47CB-AC1E-21A69A5DBB68}" type="datetimeFigureOut">
               <a:rPr lang="en-NZ" smtClean="0"/>
-              <a:t>24/10/2017</a:t>
+              <a:t>31/10/2017</a:t>
             </a:fld>
             <a:endParaRPr lang="en-NZ"/>
           </a:p>
@@ -1012,7 +1015,7 @@
           <a:p>
             <a:fld id="{29BFBE3C-366C-47CB-AC1E-21A69A5DBB68}" type="datetimeFigureOut">
               <a:rPr lang="en-NZ" smtClean="0"/>
-              <a:t>24/10/2017</a:t>
+              <a:t>31/10/2017</a:t>
             </a:fld>
             <a:endParaRPr lang="en-NZ"/>
           </a:p>
@@ -1244,7 +1247,7 @@
           <a:p>
             <a:fld id="{29BFBE3C-366C-47CB-AC1E-21A69A5DBB68}" type="datetimeFigureOut">
               <a:rPr lang="en-NZ" smtClean="0"/>
-              <a:t>24/10/2017</a:t>
+              <a:t>31/10/2017</a:t>
             </a:fld>
             <a:endParaRPr lang="en-NZ"/>
           </a:p>
@@ -1611,7 +1614,7 @@
           <a:p>
             <a:fld id="{29BFBE3C-366C-47CB-AC1E-21A69A5DBB68}" type="datetimeFigureOut">
               <a:rPr lang="en-NZ" smtClean="0"/>
-              <a:t>24/10/2017</a:t>
+              <a:t>31/10/2017</a:t>
             </a:fld>
             <a:endParaRPr lang="en-NZ"/>
           </a:p>
@@ -1729,7 +1732,7 @@
           <a:p>
             <a:fld id="{29BFBE3C-366C-47CB-AC1E-21A69A5DBB68}" type="datetimeFigureOut">
               <a:rPr lang="en-NZ" smtClean="0"/>
-              <a:t>24/10/2017</a:t>
+              <a:t>31/10/2017</a:t>
             </a:fld>
             <a:endParaRPr lang="en-NZ"/>
           </a:p>
@@ -1824,7 +1827,7 @@
           <a:p>
             <a:fld id="{29BFBE3C-366C-47CB-AC1E-21A69A5DBB68}" type="datetimeFigureOut">
               <a:rPr lang="en-NZ" smtClean="0"/>
-              <a:t>24/10/2017</a:t>
+              <a:t>31/10/2017</a:t>
             </a:fld>
             <a:endParaRPr lang="en-NZ"/>
           </a:p>
@@ -2101,7 +2104,7 @@
           <a:p>
             <a:fld id="{29BFBE3C-366C-47CB-AC1E-21A69A5DBB68}" type="datetimeFigureOut">
               <a:rPr lang="en-NZ" smtClean="0"/>
-              <a:t>24/10/2017</a:t>
+              <a:t>31/10/2017</a:t>
             </a:fld>
             <a:endParaRPr lang="en-NZ"/>
           </a:p>
@@ -2354,7 +2357,7 @@
           <a:p>
             <a:fld id="{29BFBE3C-366C-47CB-AC1E-21A69A5DBB68}" type="datetimeFigureOut">
               <a:rPr lang="en-NZ" smtClean="0"/>
-              <a:t>24/10/2017</a:t>
+              <a:t>31/10/2017</a:t>
             </a:fld>
             <a:endParaRPr lang="en-NZ"/>
           </a:p>
@@ -2567,7 +2570,7 @@
           <a:p>
             <a:fld id="{29BFBE3C-366C-47CB-AC1E-21A69A5DBB68}" type="datetimeFigureOut">
               <a:rPr lang="en-NZ" smtClean="0"/>
-              <a:t>24/10/2017</a:t>
+              <a:t>31/10/2017</a:t>
             </a:fld>
             <a:endParaRPr lang="en-NZ"/>
           </a:p>
@@ -2989,11 +2992,7 @@
           <a:p>
             <a:r>
               <a:rPr lang="en-NZ" dirty="0" smtClean="0"/>
-              <a:t>Assignment </a:t>
-            </a:r>
-            <a:r>
-              <a:rPr lang="en-NZ" dirty="0" smtClean="0"/>
-              <a:t>3</a:t>
+              <a:t>Assignment 3</a:t>
             </a:r>
             <a:endParaRPr lang="en-NZ" dirty="0"/>
           </a:p>
@@ -3223,8 +3222,12 @@
           <a:lstStyle/>
           <a:p>
             <a:r>
-              <a:rPr lang="en-US" smtClean="0"/>
-              <a:t>Part 2 -TBA</a:t>
+              <a:rPr lang="en-US" dirty="0" smtClean="0"/>
+              <a:t>Part 2 </a:t>
+            </a:r>
+            <a:r>
+              <a:rPr lang="en-US" dirty="0" smtClean="0"/>
+              <a:t>–Applying Design Pattern 1</a:t>
             </a:r>
             <a:endParaRPr lang="en-US" dirty="0"/>
           </a:p>
@@ -3245,6 +3248,268 @@
           <a:bodyPr/>
           <a:lstStyle/>
           <a:p>
+            <a:pPr marL="0" indent="0">
+              <a:buNone/>
+            </a:pPr>
+            <a:r>
+              <a:rPr lang="en-US" dirty="0" smtClean="0"/>
+              <a:t>Name: Builder</a:t>
+            </a:r>
+          </a:p>
+          <a:p>
+            <a:pPr marL="0" indent="0">
+              <a:buNone/>
+            </a:pPr>
+            <a:r>
+              <a:rPr lang="en-US" dirty="0" smtClean="0"/>
+              <a:t>Location: TBA</a:t>
+            </a:r>
+          </a:p>
+          <a:p>
+            <a:pPr marL="0" indent="0">
+              <a:buNone/>
+            </a:pPr>
+            <a:r>
+              <a:rPr lang="en-US" dirty="0" smtClean="0"/>
+              <a:t>Why this Pattern?: TBA</a:t>
+            </a:r>
+          </a:p>
+          <a:p>
+            <a:pPr marL="0" indent="0">
+              <a:buNone/>
+            </a:pPr>
+            <a:r>
+              <a:rPr lang="en-US" dirty="0" smtClean="0"/>
+              <a:t>Class Diagram Before: before</a:t>
+            </a:r>
+          </a:p>
+          <a:p>
+            <a:pPr marL="0" indent="0">
+              <a:buNone/>
+            </a:pPr>
+            <a:r>
+              <a:rPr lang="en-US" dirty="0" smtClean="0"/>
+              <a:t>Class Diagram After: after</a:t>
+            </a:r>
+            <a:endParaRPr lang="en-US" dirty="0"/>
+          </a:p>
+        </p:txBody>
+      </p:sp>
+    </p:spTree>
+    <p:extLst>
+      <p:ext uri="{BB962C8B-B14F-4D97-AF65-F5344CB8AC3E}">
+        <p14:creationId xmlns:p14="http://schemas.microsoft.com/office/powerpoint/2010/main" val="3433318521"/>
+      </p:ext>
+    </p:extLst>
+  </p:cSld>
+  <p:clrMapOvr>
+    <a:masterClrMapping/>
+  </p:clrMapOvr>
+</p:sld>
+</file>
+
+<file path=ppt/slides/slide5.xml><?xml version="1.0" encoding="utf-8"?>
+<p:sld xmlns:a="http://schemas.openxmlformats.org/drawingml/2006/main" xmlns:r="http://schemas.openxmlformats.org/officeDocument/2006/relationships" xmlns:p="http://schemas.openxmlformats.org/presentationml/2006/main">
+  <p:cSld>
+    <p:spTree>
+      <p:nvGrpSpPr>
+        <p:cNvPr id="1" name=""/>
+        <p:cNvGrpSpPr/>
+        <p:nvPr/>
+      </p:nvGrpSpPr>
+      <p:grpSpPr>
+        <a:xfrm>
+          <a:off x="0" y="0"/>
+          <a:ext cx="0" cy="0"/>
+          <a:chOff x="0" y="0"/>
+          <a:chExt cx="0" cy="0"/>
+        </a:xfrm>
+      </p:grpSpPr>
+      <p:sp>
+        <p:nvSpPr>
+          <p:cNvPr id="2" name="Title 1"/>
+          <p:cNvSpPr>
+            <a:spLocks noGrp="1"/>
+          </p:cNvSpPr>
+          <p:nvPr>
+            <p:ph type="title"/>
+          </p:nvPr>
+        </p:nvSpPr>
+        <p:spPr/>
+        <p:txBody>
+          <a:bodyPr/>
+          <a:lstStyle/>
+          <a:p>
+            <a:r>
+              <a:rPr lang="en-US" dirty="0" smtClean="0"/>
+              <a:t>Part 2 </a:t>
+            </a:r>
+            <a:r>
+              <a:rPr lang="en-US" dirty="0" smtClean="0"/>
+              <a:t>–Applying Design Pattern 1</a:t>
+            </a:r>
+            <a:endParaRPr lang="en-US" dirty="0"/>
+          </a:p>
+        </p:txBody>
+      </p:sp>
+      <p:sp>
+        <p:nvSpPr>
+          <p:cNvPr id="3" name="Content Placeholder 2"/>
+          <p:cNvSpPr>
+            <a:spLocks noGrp="1"/>
+          </p:cNvSpPr>
+          <p:nvPr>
+            <p:ph idx="1"/>
+          </p:nvPr>
+        </p:nvSpPr>
+        <p:spPr/>
+        <p:txBody>
+          <a:bodyPr/>
+          <a:lstStyle/>
+          <a:p>
+            <a:pPr marL="0" indent="0">
+              <a:buNone/>
+            </a:pPr>
+            <a:r>
+              <a:rPr lang="en-US" b="1" dirty="0" smtClean="0"/>
+              <a:t>Location</a:t>
+            </a:r>
+            <a:r>
+              <a:rPr lang="en-US" dirty="0" smtClean="0"/>
+              <a:t> </a:t>
+            </a:r>
+          </a:p>
+          <a:p>
+            <a:pPr marL="0" indent="0">
+              <a:buNone/>
+            </a:pPr>
+            <a:r>
+              <a:rPr lang="en-US" dirty="0" smtClean="0"/>
+              <a:t>Client code starts </a:t>
+            </a:r>
+            <a:r>
+              <a:rPr lang="en-US" dirty="0"/>
+              <a:t>in </a:t>
+            </a:r>
+            <a:r>
+              <a:rPr lang="en-US" dirty="0" err="1" smtClean="0"/>
+              <a:t>InterpreterControler.do_show</a:t>
+            </a:r>
+            <a:r>
+              <a:rPr lang="en-US" dirty="0" smtClean="0"/>
+              <a:t>() which calls the specific </a:t>
+            </a:r>
+            <a:r>
+              <a:rPr lang="en-US" dirty="0" err="1" smtClean="0"/>
+              <a:t>GraphView</a:t>
+            </a:r>
+            <a:r>
+              <a:rPr lang="en-US" dirty="0" smtClean="0"/>
+              <a:t> method.</a:t>
+            </a:r>
+          </a:p>
+          <a:p>
+            <a:pPr marL="0" indent="0">
+              <a:buNone/>
+            </a:pPr>
+            <a:r>
+              <a:rPr lang="en-US" dirty="0" smtClean="0"/>
+              <a:t>Main logic for producing graphs is in </a:t>
+            </a:r>
+            <a:r>
+              <a:rPr lang="en-US" dirty="0" err="1" smtClean="0"/>
+              <a:t>GraphView</a:t>
+            </a:r>
+            <a:r>
+              <a:rPr lang="en-US" smtClean="0"/>
+              <a:t> class.</a:t>
+            </a:r>
+            <a:endParaRPr lang="en-US" dirty="0" smtClean="0"/>
+          </a:p>
+          <a:p>
+            <a:pPr marL="0" indent="0">
+              <a:buNone/>
+            </a:pPr>
+            <a:endParaRPr lang="en-US" dirty="0" smtClean="0"/>
+          </a:p>
+        </p:txBody>
+      </p:sp>
+    </p:spTree>
+    <p:extLst>
+      <p:ext uri="{BB962C8B-B14F-4D97-AF65-F5344CB8AC3E}">
+        <p14:creationId xmlns:p14="http://schemas.microsoft.com/office/powerpoint/2010/main" val="2637684444"/>
+      </p:ext>
+    </p:extLst>
+  </p:cSld>
+  <p:clrMapOvr>
+    <a:masterClrMapping/>
+  </p:clrMapOvr>
+</p:sld>
+</file>
+
+<file path=ppt/slides/slide6.xml><?xml version="1.0" encoding="utf-8"?>
+<p:sld xmlns:a="http://schemas.openxmlformats.org/drawingml/2006/main" xmlns:r="http://schemas.openxmlformats.org/officeDocument/2006/relationships" xmlns:p="http://schemas.openxmlformats.org/presentationml/2006/main">
+  <p:cSld>
+    <p:spTree>
+      <p:nvGrpSpPr>
+        <p:cNvPr id="1" name=""/>
+        <p:cNvGrpSpPr/>
+        <p:nvPr/>
+      </p:nvGrpSpPr>
+      <p:grpSpPr>
+        <a:xfrm>
+          <a:off x="0" y="0"/>
+          <a:ext cx="0" cy="0"/>
+          <a:chOff x="0" y="0"/>
+          <a:chExt cx="0" cy="0"/>
+        </a:xfrm>
+      </p:grpSpPr>
+      <p:sp>
+        <p:nvSpPr>
+          <p:cNvPr id="2" name="Title 1"/>
+          <p:cNvSpPr>
+            <a:spLocks noGrp="1"/>
+          </p:cNvSpPr>
+          <p:nvPr>
+            <p:ph type="title"/>
+          </p:nvPr>
+        </p:nvSpPr>
+        <p:spPr/>
+        <p:txBody>
+          <a:bodyPr/>
+          <a:lstStyle/>
+          <a:p>
+            <a:r>
+              <a:rPr lang="en-US" dirty="0" smtClean="0"/>
+              <a:t>Part 2 </a:t>
+            </a:r>
+            <a:r>
+              <a:rPr lang="en-US" dirty="0" smtClean="0"/>
+              <a:t>–Applying Design Pattern 1</a:t>
+            </a:r>
+            <a:endParaRPr lang="en-US" dirty="0"/>
+          </a:p>
+        </p:txBody>
+      </p:sp>
+      <p:sp>
+        <p:nvSpPr>
+          <p:cNvPr id="3" name="Content Placeholder 2"/>
+          <p:cNvSpPr>
+            <a:spLocks noGrp="1"/>
+          </p:cNvSpPr>
+          <p:nvPr>
+            <p:ph idx="1"/>
+          </p:nvPr>
+        </p:nvSpPr>
+        <p:spPr/>
+        <p:txBody>
+          <a:bodyPr/>
+          <a:lstStyle/>
+          <a:p>
+            <a:r>
+              <a:rPr lang="en-US" dirty="0" smtClean="0"/>
+              <a:t>Applying Pattern Evidence</a:t>
+            </a:r>
             <a:endParaRPr lang="en-US" dirty="0"/>
           </a:p>
         </p:txBody>
@@ -3253,6 +3518,82 @@
     <p:extLst>
       <p:ext uri="{BB962C8B-B14F-4D97-AF65-F5344CB8AC3E}">
         <p14:creationId xmlns:p14="http://schemas.microsoft.com/office/powerpoint/2010/main" val="3375627341"/>
+      </p:ext>
+    </p:extLst>
+  </p:cSld>
+  <p:clrMapOvr>
+    <a:masterClrMapping/>
+  </p:clrMapOvr>
+</p:sld>
+</file>
+
+<file path=ppt/slides/slide7.xml><?xml version="1.0" encoding="utf-8"?>
+<p:sld xmlns:a="http://schemas.openxmlformats.org/drawingml/2006/main" xmlns:r="http://schemas.openxmlformats.org/officeDocument/2006/relationships" xmlns:p="http://schemas.openxmlformats.org/presentationml/2006/main">
+  <p:cSld>
+    <p:spTree>
+      <p:nvGrpSpPr>
+        <p:cNvPr id="1" name=""/>
+        <p:cNvGrpSpPr/>
+        <p:nvPr/>
+      </p:nvGrpSpPr>
+      <p:grpSpPr>
+        <a:xfrm>
+          <a:off x="0" y="0"/>
+          <a:ext cx="0" cy="0"/>
+          <a:chOff x="0" y="0"/>
+          <a:chExt cx="0" cy="0"/>
+        </a:xfrm>
+      </p:grpSpPr>
+      <p:sp>
+        <p:nvSpPr>
+          <p:cNvPr id="2" name="Title 1"/>
+          <p:cNvSpPr>
+            <a:spLocks noGrp="1"/>
+          </p:cNvSpPr>
+          <p:nvPr>
+            <p:ph type="title"/>
+          </p:nvPr>
+        </p:nvSpPr>
+        <p:spPr/>
+        <p:txBody>
+          <a:bodyPr/>
+          <a:lstStyle/>
+          <a:p>
+            <a:r>
+              <a:rPr lang="en-US" dirty="0" smtClean="0"/>
+              <a:t>Part 2 </a:t>
+            </a:r>
+            <a:r>
+              <a:rPr lang="en-US" dirty="0" smtClean="0"/>
+              <a:t>–Applying Design Pattern 2</a:t>
+            </a:r>
+            <a:endParaRPr lang="en-US" dirty="0"/>
+          </a:p>
+        </p:txBody>
+      </p:sp>
+      <p:sp>
+        <p:nvSpPr>
+          <p:cNvPr id="3" name="Content Placeholder 2"/>
+          <p:cNvSpPr>
+            <a:spLocks noGrp="1"/>
+          </p:cNvSpPr>
+          <p:nvPr>
+            <p:ph idx="1"/>
+          </p:nvPr>
+        </p:nvSpPr>
+        <p:spPr/>
+        <p:txBody>
+          <a:bodyPr/>
+          <a:lstStyle/>
+          <a:p>
+            <a:endParaRPr lang="en-US" dirty="0"/>
+          </a:p>
+        </p:txBody>
+      </p:sp>
+    </p:spTree>
+    <p:extLst>
+      <p:ext uri="{BB962C8B-B14F-4D97-AF65-F5344CB8AC3E}">
+        <p14:creationId xmlns:p14="http://schemas.microsoft.com/office/powerpoint/2010/main" val="1567675488"/>
       </p:ext>
     </p:extLst>
   </p:cSld>

</xml_diff>